<commit_message>
instance, Class, and Static Method,
</commit_message>
<xml_diff>
--- a/51_60/ch55_InstClassVar/ch55_InstClassVar.pptx
+++ b/51_60/ch55_InstClassVar/ch55_InstClassVar.pptx
@@ -3455,7 +3455,7 @@
                   <a:srgbClr val="FFFF00"/>
                 </a:solidFill>
               </a:rPr>
-              <a:t>54 Constructor and Self</a:t>
+              <a:t>55 Instance and Class Variables</a:t>
             </a:r>
             <a:endParaRPr lang="zh-TW" altLang="en-US" sz="4800" b="1" dirty="0">
               <a:solidFill>
@@ -3651,7 +3651,7 @@
                   <a:srgbClr val="FFFF00"/>
                 </a:solidFill>
               </a:rPr>
-              <a:t>54 Constructor and Self</a:t>
+              <a:t>55 Instance and Class Variables</a:t>
             </a:r>
             <a:endParaRPr lang="zh-TW" altLang="en-US" b="1" dirty="0">
               <a:solidFill>
@@ -3804,7 +3804,7 @@
         </p:spPr>
         <p:txBody>
           <a:bodyPr vert="horz" lIns="91440" tIns="45720" rIns="91440" bIns="45720" rtlCol="0" anchor="ctr">
-            <a:normAutofit/>
+            <a:normAutofit fontScale="92500"/>
           </a:bodyPr>
           <a:lstStyle/>
           <a:p>
@@ -3814,10 +3814,10 @@
               </a:spcBef>
             </a:pPr>
             <a:r>
-              <a:rPr lang="en-US" sz="1600" dirty="0">
+              <a:rPr lang="en-US" sz="1600">
                 <a:hlinkClick r:id="rId2"/>
               </a:rPr>
-              <a:t>https://www.youtube.com/watch?v=ic6wdPxcHc0&amp;list=PLsyeobzWxl7poL9JTVyndKe62ieoN-MZ3&amp;index=54</a:t>
+              <a:t>https://www.youtube.com/watch?v=RSQjxL5WRNM&amp;list=PLsyeobzWxl7poL9JTVyndKe62ieoN-MZ3&amp;index=55</a:t>
             </a:r>
             <a:endParaRPr lang="zh-TW" altLang="en-US" sz="1600" dirty="0"/>
           </a:p>

</xml_diff>